<commit_message>
add project 5 and organize project 4
</commit_message>
<xml_diff>
--- a/Project 4 - Descriptions/Project 4 - Descriptions.pptx
+++ b/Project 4 - Descriptions/Project 4 - Descriptions.pptx
@@ -5,19 +5,23 @@
     <p:sldMasterId id="2147483648" r:id="rId1"/>
   </p:sldMasterIdLst>
   <p:sldIdLst>
-    <p:sldId id="256" r:id="rId3"/>
-    <p:sldId id="257" r:id="rId4"/>
-    <p:sldId id="269" r:id="rId5"/>
-    <p:sldId id="270" r:id="rId6"/>
-    <p:sldId id="271" r:id="rId7"/>
-    <p:sldId id="262" r:id="rId8"/>
-    <p:sldId id="259" r:id="rId9"/>
-    <p:sldId id="260" r:id="rId10"/>
-    <p:sldId id="261" r:id="rId11"/>
-    <p:sldId id="276" r:id="rId12"/>
+    <p:sldId id="256" r:id="rId2"/>
+    <p:sldId id="257" r:id="rId3"/>
+    <p:sldId id="269" r:id="rId4"/>
+    <p:sldId id="270" r:id="rId5"/>
+    <p:sldId id="271" r:id="rId6"/>
+    <p:sldId id="262" r:id="rId7"/>
+    <p:sldId id="259" r:id="rId8"/>
+    <p:sldId id="260" r:id="rId9"/>
+    <p:sldId id="261" r:id="rId10"/>
+    <p:sldId id="276" r:id="rId11"/>
+    <p:sldId id="277" r:id="rId12"/>
   </p:sldIdLst>
   <p:sldSz cx="12192000" cy="6858000"/>
   <p:notesSz cx="6858000" cy="9144000"/>
+  <p:custDataLst>
+    <p:tags r:id="rId13"/>
+  </p:custDataLst>
   <p:defaultTextStyle>
     <a:defPPr>
       <a:defRPr lang="en-US"/>
@@ -113,11 +117,16 @@
       </a:defRPr>
     </a:lvl9pPr>
   </p:defaultTextStyle>
+  <p:extLst>
+    <p:ext uri="{EFAFB233-063F-42B5-8137-9DF3F51BA10A}">
+      <p15:sldGuideLst xmlns:p15="http://schemas.microsoft.com/office/powerpoint/2012/main"/>
+    </p:ext>
+  </p:extLst>
 </p:presentation>
 </file>
 
 <file path=ppt/slideLayouts/slideLayout1.xml><?xml version="1.0" encoding="utf-8"?>
-<p:sldLayout xmlns:a="http://schemas.openxmlformats.org/drawingml/2006/main" xmlns:r="http://schemas.openxmlformats.org/officeDocument/2006/relationships" xmlns:p="http://schemas.openxmlformats.org/presentationml/2006/main" type="title" preserve="1" showMasterSp="0">
+<p:sldLayout xmlns:a="http://schemas.openxmlformats.org/drawingml/2006/main" xmlns:r="http://schemas.openxmlformats.org/officeDocument/2006/relationships" xmlns:p="http://schemas.openxmlformats.org/presentationml/2006/main" showMasterSp="0" type="title" preserve="1">
   <p:cSld name="Title Slide">
     <p:spTree>
       <p:nvGrpSpPr>
@@ -451,6 +460,7 @@
           <a:p>
             <a:fld id="{F4D57BDD-E64A-4D27-8978-82FFCA18A12C}" type="datetimeFigureOut">
               <a:rPr lang="en-US" smtClean="0"/>
+              <a:t>1/23/2023</a:t>
             </a:fld>
             <a:endParaRPr lang="en-US"/>
           </a:p>
@@ -548,6 +558,7 @@
           <a:p>
             <a:fld id="{D643A852-0206-46AC-B0EB-645612933129}" type="slidenum">
               <a:rPr lang="en-US" smtClean="0"/>
+              <a:t>‹#›</a:t>
             </a:fld>
             <a:endParaRPr lang="en-US" dirty="0"/>
           </a:p>
@@ -1512,7 +1523,6 @@
               <a:rPr lang="en-US"/>
               <a:t>Click to edit Master text styles</a:t>
             </a:r>
-            <a:endParaRPr lang="en-US"/>
           </a:p>
         </p:txBody>
       </p:sp>
@@ -1533,6 +1543,7 @@
           <a:p>
             <a:fld id="{F4D57BDD-E64A-4D27-8978-82FFCA18A12C}" type="datetimeFigureOut">
               <a:rPr lang="en-US" smtClean="0"/>
+              <a:t>1/23/2023</a:t>
             </a:fld>
             <a:endParaRPr lang="en-US" dirty="0"/>
           </a:p>
@@ -1610,6 +1621,7 @@
           <a:p>
             <a:fld id="{D643A852-0206-46AC-B0EB-645612933129}" type="slidenum">
               <a:rPr lang="en-US" smtClean="0"/>
+              <a:t>‹#›</a:t>
             </a:fld>
             <a:endParaRPr lang="en-US" dirty="0"/>
           </a:p>
@@ -1624,7 +1636,7 @@
 </file>
 
 <file path=ppt/slideLayouts/slideLayout11.xml><?xml version="1.0" encoding="utf-8"?>
-<p:sldLayout xmlns:a="http://schemas.openxmlformats.org/drawingml/2006/main" xmlns:r="http://schemas.openxmlformats.org/officeDocument/2006/relationships" xmlns:p="http://schemas.openxmlformats.org/presentationml/2006/main" preserve="1" showMasterSp="0">
+<p:sldLayout xmlns:a="http://schemas.openxmlformats.org/drawingml/2006/main" xmlns:r="http://schemas.openxmlformats.org/officeDocument/2006/relationships" xmlns:p="http://schemas.openxmlformats.org/presentationml/2006/main" showMasterSp="0" preserve="1">
   <p:cSld name="Title and Caption">
     <p:spTree>
       <p:nvGrpSpPr>
@@ -2486,7 +2498,6 @@
               <a:rPr lang="en-US"/>
               <a:t>Click to edit Master text styles</a:t>
             </a:r>
-            <a:endParaRPr lang="en-US"/>
           </a:p>
         </p:txBody>
       </p:sp>
@@ -2507,6 +2518,7 @@
           <a:p>
             <a:fld id="{F4D57BDD-E64A-4D27-8978-82FFCA18A12C}" type="datetimeFigureOut">
               <a:rPr lang="en-US" smtClean="0"/>
+              <a:t>1/23/2023</a:t>
             </a:fld>
             <a:endParaRPr lang="en-US" dirty="0"/>
           </a:p>
@@ -2584,6 +2596,7 @@
           <a:p>
             <a:fld id="{D643A852-0206-46AC-B0EB-645612933129}" type="slidenum">
               <a:rPr lang="en-US" smtClean="0"/>
+              <a:t>‹#›</a:t>
             </a:fld>
             <a:endParaRPr lang="en-US" dirty="0"/>
           </a:p>
@@ -2598,7 +2611,7 @@
 </file>
 
 <file path=ppt/slideLayouts/slideLayout12.xml><?xml version="1.0" encoding="utf-8"?>
-<p:sldLayout xmlns:a="http://schemas.openxmlformats.org/drawingml/2006/main" xmlns:r="http://schemas.openxmlformats.org/officeDocument/2006/relationships" xmlns:p="http://schemas.openxmlformats.org/presentationml/2006/main" preserve="1" showMasterSp="0">
+<p:sldLayout xmlns:a="http://schemas.openxmlformats.org/drawingml/2006/main" xmlns:r="http://schemas.openxmlformats.org/officeDocument/2006/relationships" xmlns:p="http://schemas.openxmlformats.org/presentationml/2006/main" showMasterSp="0" preserve="1">
   <p:cSld name="Quote with Caption">
     <p:spTree>
       <p:nvGrpSpPr>
@@ -3400,16 +3413,6 @@
               </a:rPr>
               <a:t>“</a:t>
             </a:r>
-            <a:endParaRPr lang="en-US" sz="9600" b="0" i="0" dirty="0">
-              <a:solidFill>
-                <a:schemeClr val="accent1">
-                  <a:lumMod val="60000"/>
-                  <a:lumOff val="40000"/>
-                </a:schemeClr>
-              </a:solidFill>
-              <a:latin typeface="Arial" panose="020B0604020202020204"/>
-              <a:cs typeface="Arial" panose="020B0604020202020204"/>
-            </a:endParaRPr>
           </a:p>
         </p:txBody>
       </p:sp>
@@ -3449,16 +3452,6 @@
               </a:rPr>
               <a:t>”</a:t>
             </a:r>
-            <a:endParaRPr lang="en-US" sz="9600" b="0" i="0" dirty="0">
-              <a:solidFill>
-                <a:schemeClr val="accent1">
-                  <a:lumMod val="60000"/>
-                  <a:lumOff val="40000"/>
-                </a:schemeClr>
-              </a:solidFill>
-              <a:latin typeface="Arial" panose="020B0604020202020204"/>
-              <a:cs typeface="Arial" panose="020B0604020202020204"/>
-            </a:endParaRPr>
           </a:p>
         </p:txBody>
       </p:sp>
@@ -3567,7 +3560,6 @@
               <a:rPr lang="en-US"/>
               <a:t>Click to edit Master text styles</a:t>
             </a:r>
-            <a:endParaRPr lang="en-US"/>
           </a:p>
         </p:txBody>
       </p:sp>
@@ -3635,7 +3627,6 @@
               <a:rPr lang="en-US"/>
               <a:t>Click to edit Master text styles</a:t>
             </a:r>
-            <a:endParaRPr lang="en-US"/>
           </a:p>
         </p:txBody>
       </p:sp>
@@ -3656,6 +3647,7 @@
           <a:p>
             <a:fld id="{F4D57BDD-E64A-4D27-8978-82FFCA18A12C}" type="datetimeFigureOut">
               <a:rPr lang="en-US" smtClean="0"/>
+              <a:t>1/23/2023</a:t>
             </a:fld>
             <a:endParaRPr lang="en-US" dirty="0"/>
           </a:p>
@@ -3733,6 +3725,7 @@
           <a:p>
             <a:fld id="{D643A852-0206-46AC-B0EB-645612933129}" type="slidenum">
               <a:rPr lang="en-US" smtClean="0"/>
+              <a:t>‹#›</a:t>
             </a:fld>
             <a:endParaRPr lang="en-US" dirty="0"/>
           </a:p>
@@ -3747,7 +3740,7 @@
 </file>
 
 <file path=ppt/slideLayouts/slideLayout13.xml><?xml version="1.0" encoding="utf-8"?>
-<p:sldLayout xmlns:a="http://schemas.openxmlformats.org/drawingml/2006/main" xmlns:r="http://schemas.openxmlformats.org/officeDocument/2006/relationships" xmlns:p="http://schemas.openxmlformats.org/presentationml/2006/main" preserve="1" showMasterSp="0">
+<p:sldLayout xmlns:a="http://schemas.openxmlformats.org/drawingml/2006/main" xmlns:r="http://schemas.openxmlformats.org/officeDocument/2006/relationships" xmlns:p="http://schemas.openxmlformats.org/presentationml/2006/main" showMasterSp="0" preserve="1">
   <p:cSld name="Name Card">
     <p:spTree>
       <p:nvGrpSpPr>
@@ -4662,7 +4655,6 @@
               <a:rPr lang="en-US"/>
               <a:t>Click to edit Master text styles</a:t>
             </a:r>
-            <a:endParaRPr lang="en-US"/>
           </a:p>
         </p:txBody>
       </p:sp>
@@ -4683,6 +4675,7 @@
           <a:p>
             <a:fld id="{F4D57BDD-E64A-4D27-8978-82FFCA18A12C}" type="datetimeFigureOut">
               <a:rPr lang="en-US" smtClean="0"/>
+              <a:t>1/23/2023</a:t>
             </a:fld>
             <a:endParaRPr lang="en-US" dirty="0"/>
           </a:p>
@@ -4760,6 +4753,7 @@
           <a:p>
             <a:fld id="{D643A852-0206-46AC-B0EB-645612933129}" type="slidenum">
               <a:rPr lang="en-US" smtClean="0"/>
+              <a:t>‹#›</a:t>
             </a:fld>
             <a:endParaRPr lang="en-US" dirty="0"/>
           </a:p>
@@ -4893,7 +4887,6 @@
               <a:rPr lang="en-US"/>
               <a:t>Click to edit Master text styles</a:t>
             </a:r>
-            <a:endParaRPr lang="en-US"/>
           </a:p>
         </p:txBody>
       </p:sp>
@@ -4961,7 +4954,6 @@
               <a:rPr lang="en-US"/>
               <a:t>Click to edit Master text styles</a:t>
             </a:r>
-            <a:endParaRPr lang="en-US"/>
           </a:p>
         </p:txBody>
       </p:sp>
@@ -5036,7 +5028,6 @@
               <a:rPr lang="en-US"/>
               <a:t>Click to edit Master text styles</a:t>
             </a:r>
-            <a:endParaRPr lang="en-US"/>
           </a:p>
         </p:txBody>
       </p:sp>
@@ -5104,7 +5095,6 @@
               <a:rPr lang="en-US"/>
               <a:t>Click to edit Master text styles</a:t>
             </a:r>
-            <a:endParaRPr lang="en-US"/>
           </a:p>
         </p:txBody>
       </p:sp>
@@ -5179,7 +5169,6 @@
               <a:rPr lang="en-US"/>
               <a:t>Click to edit Master text styles</a:t>
             </a:r>
-            <a:endParaRPr lang="en-US"/>
           </a:p>
         </p:txBody>
       </p:sp>
@@ -5247,7 +5236,6 @@
               <a:rPr lang="en-US"/>
               <a:t>Click to edit Master text styles</a:t>
             </a:r>
-            <a:endParaRPr lang="en-US"/>
           </a:p>
         </p:txBody>
       </p:sp>
@@ -5342,6 +5330,7 @@
           <a:p>
             <a:fld id="{F4D57BDD-E64A-4D27-8978-82FFCA18A12C}" type="datetimeFigureOut">
               <a:rPr lang="en-US" smtClean="0"/>
+              <a:t>1/23/2023</a:t>
             </a:fld>
             <a:endParaRPr lang="en-US" dirty="0"/>
           </a:p>
@@ -5383,6 +5372,7 @@
           <a:p>
             <a:fld id="{D643A852-0206-46AC-B0EB-645612933129}" type="slidenum">
               <a:rPr lang="en-US" smtClean="0"/>
+              <a:t>‹#›</a:t>
             </a:fld>
             <a:endParaRPr lang="en-US" dirty="0"/>
           </a:p>
@@ -5516,7 +5506,6 @@
               <a:rPr lang="en-US"/>
               <a:t>Click to edit Master text styles</a:t>
             </a:r>
-            <a:endParaRPr lang="en-US"/>
           </a:p>
         </p:txBody>
       </p:sp>
@@ -5663,7 +5652,6 @@
               <a:rPr lang="en-US"/>
               <a:t>Click to edit Master text styles</a:t>
             </a:r>
-            <a:endParaRPr lang="en-US"/>
           </a:p>
         </p:txBody>
       </p:sp>
@@ -5738,7 +5726,6 @@
               <a:rPr lang="en-US"/>
               <a:t>Click to edit Master text styles</a:t>
             </a:r>
-            <a:endParaRPr lang="en-US"/>
           </a:p>
         </p:txBody>
       </p:sp>
@@ -5885,7 +5872,6 @@
               <a:rPr lang="en-US"/>
               <a:t>Click to edit Master text styles</a:t>
             </a:r>
-            <a:endParaRPr lang="en-US"/>
           </a:p>
         </p:txBody>
       </p:sp>
@@ -5960,7 +5946,6 @@
               <a:rPr lang="en-US"/>
               <a:t>Click to edit Master text styles</a:t>
             </a:r>
-            <a:endParaRPr lang="en-US"/>
           </a:p>
         </p:txBody>
       </p:sp>
@@ -6107,7 +6092,6 @@
               <a:rPr lang="en-US"/>
               <a:t>Click to edit Master text styles</a:t>
             </a:r>
-            <a:endParaRPr lang="en-US"/>
           </a:p>
         </p:txBody>
       </p:sp>
@@ -6202,6 +6186,7 @@
           <a:p>
             <a:fld id="{F4D57BDD-E64A-4D27-8978-82FFCA18A12C}" type="datetimeFigureOut">
               <a:rPr lang="en-US" smtClean="0"/>
+              <a:t>1/23/2023</a:t>
             </a:fld>
             <a:endParaRPr lang="en-US" dirty="0"/>
           </a:p>
@@ -6248,6 +6233,7 @@
           <a:p>
             <a:fld id="{D643A852-0206-46AC-B0EB-645612933129}" type="slidenum">
               <a:rPr lang="en-US" smtClean="0"/>
+              <a:t>‹#›</a:t>
             </a:fld>
             <a:endParaRPr lang="en-US" dirty="0"/>
           </a:p>
@@ -6331,7 +6317,6 @@
               <a:rPr lang="en-US"/>
               <a:t>Click to edit Master text styles</a:t>
             </a:r>
-            <a:endParaRPr lang="en-US"/>
           </a:p>
           <a:p>
             <a:pPr lvl="1"/>
@@ -6339,7 +6324,6 @@
               <a:rPr lang="en-US"/>
               <a:t>Second level</a:t>
             </a:r>
-            <a:endParaRPr lang="en-US"/>
           </a:p>
           <a:p>
             <a:pPr lvl="2"/>
@@ -6347,7 +6331,6 @@
               <a:rPr lang="en-US"/>
               <a:t>Third level</a:t>
             </a:r>
-            <a:endParaRPr lang="en-US"/>
           </a:p>
           <a:p>
             <a:pPr lvl="3"/>
@@ -6355,7 +6338,6 @@
               <a:rPr lang="en-US"/>
               <a:t>Fourth level</a:t>
             </a:r>
-            <a:endParaRPr lang="en-US"/>
           </a:p>
           <a:p>
             <a:pPr lvl="4"/>
@@ -6389,6 +6371,7 @@
           <a:p>
             <a:fld id="{F4D57BDD-E64A-4D27-8978-82FFCA18A12C}" type="datetimeFigureOut">
               <a:rPr lang="en-US" smtClean="0"/>
+              <a:t>1/23/2023</a:t>
             </a:fld>
             <a:endParaRPr lang="en-US"/>
           </a:p>
@@ -6430,6 +6413,7 @@
           <a:p>
             <a:fld id="{D643A852-0206-46AC-B0EB-645612933129}" type="slidenum">
               <a:rPr lang="en-US" smtClean="0"/>
+              <a:t>‹#›</a:t>
             </a:fld>
             <a:endParaRPr lang="en-US"/>
           </a:p>
@@ -6444,7 +6428,7 @@
 </file>
 
 <file path=ppt/slideLayouts/slideLayout17.xml><?xml version="1.0" encoding="utf-8"?>
-<p:sldLayout xmlns:a="http://schemas.openxmlformats.org/drawingml/2006/main" xmlns:r="http://schemas.openxmlformats.org/officeDocument/2006/relationships" xmlns:p="http://schemas.openxmlformats.org/presentationml/2006/main" type="vertTitleAndTx" preserve="1" showMasterSp="0">
+<p:sldLayout xmlns:a="http://schemas.openxmlformats.org/drawingml/2006/main" xmlns:r="http://schemas.openxmlformats.org/officeDocument/2006/relationships" xmlns:p="http://schemas.openxmlformats.org/presentationml/2006/main" showMasterSp="0" type="vertTitleAndTx" preserve="1">
   <p:cSld name="Vertical Title and Text">
     <p:spTree>
       <p:nvGrpSpPr>
@@ -7300,7 +7284,6 @@
               <a:rPr lang="en-US"/>
               <a:t>Click to edit Master text styles</a:t>
             </a:r>
-            <a:endParaRPr lang="en-US"/>
           </a:p>
           <a:p>
             <a:pPr lvl="1"/>
@@ -7308,7 +7291,6 @@
               <a:rPr lang="en-US"/>
               <a:t>Second level</a:t>
             </a:r>
-            <a:endParaRPr lang="en-US"/>
           </a:p>
           <a:p>
             <a:pPr lvl="2"/>
@@ -7316,7 +7298,6 @@
               <a:rPr lang="en-US"/>
               <a:t>Third level</a:t>
             </a:r>
-            <a:endParaRPr lang="en-US"/>
           </a:p>
           <a:p>
             <a:pPr lvl="3"/>
@@ -7324,7 +7305,6 @@
               <a:rPr lang="en-US"/>
               <a:t>Fourth level</a:t>
             </a:r>
-            <a:endParaRPr lang="en-US"/>
           </a:p>
           <a:p>
             <a:pPr lvl="4"/>
@@ -7358,6 +7338,7 @@
           <a:p>
             <a:fld id="{F4D57BDD-E64A-4D27-8978-82FFCA18A12C}" type="datetimeFigureOut">
               <a:rPr lang="en-US" smtClean="0"/>
+              <a:t>1/23/2023</a:t>
             </a:fld>
             <a:endParaRPr lang="en-US"/>
           </a:p>
@@ -7435,6 +7416,7 @@
           <a:p>
             <a:fld id="{D643A852-0206-46AC-B0EB-645612933129}" type="slidenum">
               <a:rPr lang="en-US" smtClean="0"/>
+              <a:t>‹#›</a:t>
             </a:fld>
             <a:endParaRPr lang="en-US"/>
           </a:p>
@@ -7513,7 +7495,6 @@
               <a:rPr lang="en-US"/>
               <a:t>Click to edit Master text styles</a:t>
             </a:r>
-            <a:endParaRPr lang="en-US"/>
           </a:p>
           <a:p>
             <a:pPr lvl="1"/>
@@ -7521,7 +7502,6 @@
               <a:rPr lang="en-US"/>
               <a:t>Second level</a:t>
             </a:r>
-            <a:endParaRPr lang="en-US"/>
           </a:p>
           <a:p>
             <a:pPr lvl="2"/>
@@ -7529,7 +7509,6 @@
               <a:rPr lang="en-US"/>
               <a:t>Third level</a:t>
             </a:r>
-            <a:endParaRPr lang="en-US"/>
           </a:p>
           <a:p>
             <a:pPr lvl="3"/>
@@ -7537,7 +7516,6 @@
               <a:rPr lang="en-US"/>
               <a:t>Fourth level</a:t>
             </a:r>
-            <a:endParaRPr lang="en-US"/>
           </a:p>
           <a:p>
             <a:pPr lvl="4"/>
@@ -7566,6 +7544,7 @@
           <a:p>
             <a:fld id="{F4D57BDD-E64A-4D27-8978-82FFCA18A12C}" type="datetimeFigureOut">
               <a:rPr lang="en-US" smtClean="0"/>
+              <a:t>1/23/2023</a:t>
             </a:fld>
             <a:endParaRPr lang="en-US"/>
           </a:p>
@@ -7607,6 +7586,7 @@
           <a:p>
             <a:fld id="{D643A852-0206-46AC-B0EB-645612933129}" type="slidenum">
               <a:rPr lang="en-US" smtClean="0"/>
+              <a:t>‹#›</a:t>
             </a:fld>
             <a:endParaRPr lang="en-US"/>
           </a:p>
@@ -7621,7 +7601,7 @@
 </file>
 
 <file path=ppt/slideLayouts/slideLayout3.xml><?xml version="1.0" encoding="utf-8"?>
-<p:sldLayout xmlns:a="http://schemas.openxmlformats.org/drawingml/2006/main" xmlns:r="http://schemas.openxmlformats.org/officeDocument/2006/relationships" xmlns:p="http://schemas.openxmlformats.org/presentationml/2006/main" type="secHead" preserve="1" showMasterSp="0">
+<p:sldLayout xmlns:a="http://schemas.openxmlformats.org/drawingml/2006/main" xmlns:r="http://schemas.openxmlformats.org/officeDocument/2006/relationships" xmlns:p="http://schemas.openxmlformats.org/presentationml/2006/main" showMasterSp="0" type="secHead" preserve="1">
   <p:cSld name="Section Header">
     <p:spTree>
       <p:nvGrpSpPr>
@@ -8573,7 +8553,6 @@
               <a:rPr lang="en-US"/>
               <a:t>Click to edit Master text styles</a:t>
             </a:r>
-            <a:endParaRPr lang="en-US"/>
           </a:p>
         </p:txBody>
       </p:sp>
@@ -8594,6 +8573,7 @@
           <a:p>
             <a:fld id="{F4D57BDD-E64A-4D27-8978-82FFCA18A12C}" type="datetimeFigureOut">
               <a:rPr lang="en-US" smtClean="0"/>
+              <a:t>1/23/2023</a:t>
             </a:fld>
             <a:endParaRPr lang="en-US"/>
           </a:p>
@@ -8671,6 +8651,7 @@
           <a:p>
             <a:fld id="{D643A852-0206-46AC-B0EB-645612933129}" type="slidenum">
               <a:rPr lang="en-US" smtClean="0"/>
+              <a:t>‹#›</a:t>
             </a:fld>
             <a:endParaRPr lang="en-US"/>
           </a:p>
@@ -8751,7 +8732,6 @@
               <a:rPr lang="en-US"/>
               <a:t>Click to edit Master text styles</a:t>
             </a:r>
-            <a:endParaRPr lang="en-US"/>
           </a:p>
           <a:p>
             <a:pPr lvl="1"/>
@@ -8759,7 +8739,6 @@
               <a:rPr lang="en-US"/>
               <a:t>Second level</a:t>
             </a:r>
-            <a:endParaRPr lang="en-US"/>
           </a:p>
           <a:p>
             <a:pPr lvl="2"/>
@@ -8767,7 +8746,6 @@
               <a:rPr lang="en-US"/>
               <a:t>Third level</a:t>
             </a:r>
-            <a:endParaRPr lang="en-US"/>
           </a:p>
           <a:p>
             <a:pPr lvl="3"/>
@@ -8775,7 +8753,6 @@
               <a:rPr lang="en-US"/>
               <a:t>Fourth level</a:t>
             </a:r>
-            <a:endParaRPr lang="en-US"/>
           </a:p>
           <a:p>
             <a:pPr lvl="4"/>
@@ -8814,7 +8791,6 @@
               <a:rPr lang="en-US"/>
               <a:t>Click to edit Master text styles</a:t>
             </a:r>
-            <a:endParaRPr lang="en-US"/>
           </a:p>
           <a:p>
             <a:pPr lvl="1"/>
@@ -8822,7 +8798,6 @@
               <a:rPr lang="en-US"/>
               <a:t>Second level</a:t>
             </a:r>
-            <a:endParaRPr lang="en-US"/>
           </a:p>
           <a:p>
             <a:pPr lvl="2"/>
@@ -8830,7 +8805,6 @@
               <a:rPr lang="en-US"/>
               <a:t>Third level</a:t>
             </a:r>
-            <a:endParaRPr lang="en-US"/>
           </a:p>
           <a:p>
             <a:pPr lvl="3"/>
@@ -8838,7 +8812,6 @@
               <a:rPr lang="en-US"/>
               <a:t>Fourth level</a:t>
             </a:r>
-            <a:endParaRPr lang="en-US"/>
           </a:p>
           <a:p>
             <a:pPr lvl="4"/>
@@ -8867,6 +8840,7 @@
           <a:p>
             <a:fld id="{F4D57BDD-E64A-4D27-8978-82FFCA18A12C}" type="datetimeFigureOut">
               <a:rPr lang="en-US" smtClean="0"/>
+              <a:t>1/23/2023</a:t>
             </a:fld>
             <a:endParaRPr lang="en-US"/>
           </a:p>
@@ -8908,6 +8882,7 @@
           <a:p>
             <a:fld id="{D643A852-0206-46AC-B0EB-645612933129}" type="slidenum">
               <a:rPr lang="en-US" smtClean="0"/>
+              <a:t>‹#›</a:t>
             </a:fld>
             <a:endParaRPr lang="en-US"/>
           </a:p>
@@ -9033,7 +9008,6 @@
               <a:rPr lang="en-US"/>
               <a:t>Click to edit Master text styles</a:t>
             </a:r>
-            <a:endParaRPr lang="en-US"/>
           </a:p>
         </p:txBody>
       </p:sp>
@@ -9064,7 +9038,6 @@
               <a:rPr lang="en-US"/>
               <a:t>Click to edit Master text styles</a:t>
             </a:r>
-            <a:endParaRPr lang="en-US"/>
           </a:p>
           <a:p>
             <a:pPr lvl="1"/>
@@ -9072,7 +9045,6 @@
               <a:rPr lang="en-US"/>
               <a:t>Second level</a:t>
             </a:r>
-            <a:endParaRPr lang="en-US"/>
           </a:p>
           <a:p>
             <a:pPr lvl="2"/>
@@ -9080,7 +9052,6 @@
               <a:rPr lang="en-US"/>
               <a:t>Third level</a:t>
             </a:r>
-            <a:endParaRPr lang="en-US"/>
           </a:p>
           <a:p>
             <a:pPr lvl="3"/>
@@ -9088,7 +9059,6 @@
               <a:rPr lang="en-US"/>
               <a:t>Fourth level</a:t>
             </a:r>
-            <a:endParaRPr lang="en-US"/>
           </a:p>
           <a:p>
             <a:pPr lvl="4"/>
@@ -9168,7 +9138,6 @@
               <a:rPr lang="en-US"/>
               <a:t>Click to edit Master text styles</a:t>
             </a:r>
-            <a:endParaRPr lang="en-US"/>
           </a:p>
         </p:txBody>
       </p:sp>
@@ -9227,7 +9196,6 @@
               <a:rPr lang="en-US"/>
               <a:t>Click to edit Master text styles</a:t>
             </a:r>
-            <a:endParaRPr lang="en-US"/>
           </a:p>
           <a:p>
             <a:pPr lvl="1"/>
@@ -9235,7 +9203,6 @@
               <a:rPr lang="en-US"/>
               <a:t>Second level</a:t>
             </a:r>
-            <a:endParaRPr lang="en-US"/>
           </a:p>
           <a:p>
             <a:pPr lvl="2"/>
@@ -9243,7 +9210,6 @@
               <a:rPr lang="en-US"/>
               <a:t>Third level</a:t>
             </a:r>
-            <a:endParaRPr lang="en-US"/>
           </a:p>
           <a:p>
             <a:pPr lvl="3"/>
@@ -9251,7 +9217,6 @@
               <a:rPr lang="en-US"/>
               <a:t>Fourth level</a:t>
             </a:r>
-            <a:endParaRPr lang="en-US"/>
           </a:p>
           <a:p>
             <a:pPr lvl="4"/>
@@ -9280,6 +9245,7 @@
           <a:p>
             <a:fld id="{F4D57BDD-E64A-4D27-8978-82FFCA18A12C}" type="datetimeFigureOut">
               <a:rPr lang="en-US" smtClean="0"/>
+              <a:t>1/23/2023</a:t>
             </a:fld>
             <a:endParaRPr lang="en-US"/>
           </a:p>
@@ -9321,6 +9287,7 @@
           <a:p>
             <a:fld id="{D643A852-0206-46AC-B0EB-645612933129}" type="slidenum">
               <a:rPr lang="en-US" smtClean="0"/>
+              <a:t>‹#›</a:t>
             </a:fld>
             <a:endParaRPr lang="en-US"/>
           </a:p>
@@ -9400,6 +9367,7 @@
           <a:p>
             <a:fld id="{F4D57BDD-E64A-4D27-8978-82FFCA18A12C}" type="datetimeFigureOut">
               <a:rPr lang="en-US" smtClean="0"/>
+              <a:t>1/23/2023</a:t>
             </a:fld>
             <a:endParaRPr lang="en-US"/>
           </a:p>
@@ -9441,6 +9409,7 @@
           <a:p>
             <a:fld id="{D643A852-0206-46AC-B0EB-645612933129}" type="slidenum">
               <a:rPr lang="en-US" smtClean="0"/>
+              <a:t>‹#›</a:t>
             </a:fld>
             <a:endParaRPr lang="en-US"/>
           </a:p>
@@ -9455,7 +9424,7 @@
 </file>
 
 <file path=ppt/slideLayouts/slideLayout7.xml><?xml version="1.0" encoding="utf-8"?>
-<p:sldLayout xmlns:a="http://schemas.openxmlformats.org/drawingml/2006/main" xmlns:r="http://schemas.openxmlformats.org/officeDocument/2006/relationships" xmlns:p="http://schemas.openxmlformats.org/presentationml/2006/main" type="blank" preserve="1" showMasterSp="0">
+<p:sldLayout xmlns:a="http://schemas.openxmlformats.org/drawingml/2006/main" xmlns:r="http://schemas.openxmlformats.org/officeDocument/2006/relationships" xmlns:p="http://schemas.openxmlformats.org/presentationml/2006/main" showMasterSp="0" type="blank" preserve="1">
   <p:cSld name="Blank">
     <p:spTree>
       <p:nvGrpSpPr>
@@ -9488,6 +9457,7 @@
           <a:p>
             <a:fld id="{F4D57BDD-E64A-4D27-8978-82FFCA18A12C}" type="datetimeFigureOut">
               <a:rPr lang="en-US" smtClean="0"/>
+              <a:t>1/23/2023</a:t>
             </a:fld>
             <a:endParaRPr lang="en-US"/>
           </a:p>
@@ -9565,6 +9535,7 @@
           <a:p>
             <a:fld id="{D643A852-0206-46AC-B0EB-645612933129}" type="slidenum">
               <a:rPr lang="en-US" smtClean="0"/>
+              <a:t>‹#›</a:t>
             </a:fld>
             <a:endParaRPr lang="en-US"/>
           </a:p>
@@ -9579,7 +9550,7 @@
 </file>
 
 <file path=ppt/slideLayouts/slideLayout8.xml><?xml version="1.0" encoding="utf-8"?>
-<p:sldLayout xmlns:a="http://schemas.openxmlformats.org/drawingml/2006/main" xmlns:r="http://schemas.openxmlformats.org/officeDocument/2006/relationships" xmlns:p="http://schemas.openxmlformats.org/presentationml/2006/main" type="objTx" preserve="1" showMasterSp="0">
+<p:sldLayout xmlns:a="http://schemas.openxmlformats.org/drawingml/2006/main" xmlns:r="http://schemas.openxmlformats.org/officeDocument/2006/relationships" xmlns:p="http://schemas.openxmlformats.org/presentationml/2006/main" showMasterSp="0" type="objTx" preserve="1">
   <p:cSld name="Content with Caption">
     <p:spTree>
       <p:nvGrpSpPr>
@@ -10441,7 +10412,6 @@
               <a:rPr lang="en-US"/>
               <a:t>Click to edit Master text styles</a:t>
             </a:r>
-            <a:endParaRPr lang="en-US"/>
           </a:p>
           <a:p>
             <a:pPr lvl="1"/>
@@ -10449,7 +10419,6 @@
               <a:rPr lang="en-US"/>
               <a:t>Second level</a:t>
             </a:r>
-            <a:endParaRPr lang="en-US"/>
           </a:p>
           <a:p>
             <a:pPr lvl="2"/>
@@ -10457,7 +10426,6 @@
               <a:rPr lang="en-US"/>
               <a:t>Third level</a:t>
             </a:r>
-            <a:endParaRPr lang="en-US"/>
           </a:p>
           <a:p>
             <a:pPr lvl="3"/>
@@ -10465,7 +10433,6 @@
               <a:rPr lang="en-US"/>
               <a:t>Fourth level</a:t>
             </a:r>
-            <a:endParaRPr lang="en-US"/>
           </a:p>
           <a:p>
             <a:pPr lvl="4"/>
@@ -10546,7 +10513,6 @@
               <a:rPr lang="en-US"/>
               <a:t>Click to edit Master text styles</a:t>
             </a:r>
-            <a:endParaRPr lang="en-US"/>
           </a:p>
         </p:txBody>
       </p:sp>
@@ -10567,6 +10533,7 @@
           <a:p>
             <a:fld id="{F4D57BDD-E64A-4D27-8978-82FFCA18A12C}" type="datetimeFigureOut">
               <a:rPr lang="en-US" smtClean="0"/>
+              <a:t>1/23/2023</a:t>
             </a:fld>
             <a:endParaRPr lang="en-US"/>
           </a:p>
@@ -10644,6 +10611,7 @@
           <a:p>
             <a:fld id="{D643A852-0206-46AC-B0EB-645612933129}" type="slidenum">
               <a:rPr lang="en-US" smtClean="0"/>
+              <a:t>‹#›</a:t>
             </a:fld>
             <a:endParaRPr lang="en-US"/>
           </a:p>
@@ -10658,7 +10626,7 @@
 </file>
 
 <file path=ppt/slideLayouts/slideLayout9.xml><?xml version="1.0" encoding="utf-8"?>
-<p:sldLayout xmlns:a="http://schemas.openxmlformats.org/drawingml/2006/main" xmlns:r="http://schemas.openxmlformats.org/officeDocument/2006/relationships" xmlns:p="http://schemas.openxmlformats.org/presentationml/2006/main" type="picTx" preserve="1" showMasterSp="0">
+<p:sldLayout xmlns:a="http://schemas.openxmlformats.org/drawingml/2006/main" xmlns:r="http://schemas.openxmlformats.org/officeDocument/2006/relationships" xmlns:p="http://schemas.openxmlformats.org/presentationml/2006/main" showMasterSp="0" type="picTx" preserve="1">
   <p:cSld name="Picture with Caption">
     <p:spTree>
       <p:nvGrpSpPr>
@@ -11648,7 +11616,6 @@
               <a:rPr lang="en-US"/>
               <a:t>Click to edit Master text styles</a:t>
             </a:r>
-            <a:endParaRPr lang="en-US"/>
           </a:p>
         </p:txBody>
       </p:sp>
@@ -11669,6 +11636,7 @@
           <a:p>
             <a:fld id="{F4D57BDD-E64A-4D27-8978-82FFCA18A12C}" type="datetimeFigureOut">
               <a:rPr lang="en-US" smtClean="0"/>
+              <a:t>1/23/2023</a:t>
             </a:fld>
             <a:endParaRPr lang="en-US"/>
           </a:p>
@@ -11746,6 +11714,7 @@
           <a:p>
             <a:fld id="{D643A852-0206-46AC-B0EB-645612933129}" type="slidenum">
               <a:rPr lang="en-US" smtClean="0"/>
+              <a:t>‹#›</a:t>
             </a:fld>
             <a:endParaRPr lang="en-US"/>
           </a:p>
@@ -11810,7 +11779,7 @@
               <a:avLst/>
             </a:prstGeom>
             <a:blipFill>
-              <a:blip r:embed="rId18">
+              <a:blip r:embed="rId19">
                 <a:duotone>
                   <a:schemeClr val="dk2">
                     <a:shade val="69000"/>
@@ -12594,7 +12563,6 @@
               <a:rPr lang="en-US"/>
               <a:t>Click to edit Master text styles</a:t>
             </a:r>
-            <a:endParaRPr lang="en-US"/>
           </a:p>
           <a:p>
             <a:pPr lvl="1"/>
@@ -12602,7 +12570,6 @@
               <a:rPr lang="en-US"/>
               <a:t>Second level</a:t>
             </a:r>
-            <a:endParaRPr lang="en-US"/>
           </a:p>
           <a:p>
             <a:pPr lvl="2"/>
@@ -12610,7 +12577,6 @@
               <a:rPr lang="en-US"/>
               <a:t>Third level</a:t>
             </a:r>
-            <a:endParaRPr lang="en-US"/>
           </a:p>
           <a:p>
             <a:pPr lvl="3"/>
@@ -12618,7 +12584,6 @@
               <a:rPr lang="en-US"/>
               <a:t>Fourth level</a:t>
             </a:r>
-            <a:endParaRPr lang="en-US"/>
           </a:p>
           <a:p>
             <a:pPr lvl="4"/>
@@ -12663,6 +12628,7 @@
           <a:p>
             <a:fld id="{F4D57BDD-E64A-4D27-8978-82FFCA18A12C}" type="datetimeFigureOut">
               <a:rPr lang="en-US" smtClean="0"/>
+              <a:t>1/23/2023</a:t>
             </a:fld>
             <a:endParaRPr lang="en-US" dirty="0"/>
           </a:p>
@@ -12772,6 +12738,7 @@
           <a:p>
             <a:fld id="{D643A852-0206-46AC-B0EB-645612933129}" type="slidenum">
               <a:rPr lang="en-US" smtClean="0"/>
+              <a:t>‹#›</a:t>
             </a:fld>
             <a:endParaRPr lang="en-US" dirty="0"/>
           </a:p>
@@ -13257,7 +13224,6 @@
               <a:rPr lang="en-US" sz="2800" dirty="0"/>
               <a:t>Project 3 – Home Price Changes in Southern California</a:t>
             </a:r>
-            <a:endParaRPr lang="en-US" sz="2800" dirty="0"/>
           </a:p>
         </p:txBody>
       </p:sp>
@@ -13270,7 +13236,7 @@
           <p:nvPr/>
         </p:nvPicPr>
         <p:blipFill rotWithShape="1">
-          <a:blip r:embed="rId1"/>
+          <a:blip r:embed="rId2"/>
           <a:srcRect l="28427" r="31573"/>
           <a:stretch>
             <a:fillRect/>
@@ -15206,7 +15172,14 @@
         <p:cNvGrpSpPr/>
         <p:nvPr/>
       </p:nvGrpSpPr>
-      <p:grpSpPr/>
+      <p:grpSpPr>
+        <a:xfrm>
+          <a:off x="0" y="0"/>
+          <a:ext cx="0" cy="0"/>
+          <a:chOff x="0" y="0"/>
+          <a:chExt cx="0" cy="0"/>
+        </a:xfrm>
+      </p:grpSpPr>
       <p:sp>
         <p:nvSpPr>
           <p:cNvPr id="2" name="Title 1"/>
@@ -15220,12 +15193,12 @@
         <p:spPr/>
         <p:txBody>
           <a:bodyPr/>
+          <a:lstStyle/>
           <a:p>
             <a:r>
               <a:rPr lang="en-US"/>
               <a:t>Case-Shiller Index</a:t>
             </a:r>
-            <a:endParaRPr lang="en-US"/>
           </a:p>
         </p:txBody>
       </p:sp>
@@ -15238,7 +15211,7 @@
         <p:spPr>
           <a:xfrm>
             <a:off x="753745" y="2497455"/>
-            <a:ext cx="8773160" cy="3415030"/>
+            <a:ext cx="8773160" cy="3970318"/>
           </a:xfrm>
           <a:prstGeom prst="rect">
             <a:avLst/>
@@ -15249,43 +15222,203 @@
           <a:bodyPr wrap="square" rtlCol="0">
             <a:spAutoFit/>
           </a:bodyPr>
-          <a:p>
-            <a:r>
-              <a:rPr lang="en-US"/>
-              <a:t>Ideally, if we can track the price changes of each house every month, we can know the change of house prices.</a:t>
-            </a:r>
-            <a:endParaRPr lang="en-US"/>
-          </a:p>
-          <a:p>
-            <a:endParaRPr lang="en-US"/>
-          </a:p>
-          <a:p>
-            <a:r>
-              <a:rPr lang="en-US"/>
+          <a:lstStyle/>
+          <a:p>
+            <a:r>
+              <a:rPr lang="en-US" dirty="0"/>
+              <a:t>Ideally, we need to track home price changes of each house every month. </a:t>
+            </a:r>
+          </a:p>
+          <a:p>
+            <a:r>
+              <a:rPr lang="en-US" altLang="zh-CN" dirty="0">
+                <a:sym typeface="+mn-ea"/>
+              </a:rPr>
               <a:t>But there’s no way we will trade our house every month.</a:t>
             </a:r>
-            <a:endParaRPr lang="en-US"/>
-          </a:p>
-          <a:p>
-            <a:endParaRPr lang="en-US"/>
-          </a:p>
-          <a:p>
-            <a:r>
-              <a:rPr lang="en-US"/>
-              <a:t>Practically, we can do the following:</a:t>
-            </a:r>
-            <a:endParaRPr lang="en-US"/>
-          </a:p>
-          <a:p>
-            <a:r>
-              <a:rPr lang="en-US"/>
-              <a:t>Take zip code 90101 as an example, if in 2018/01 there were 1000 houses sold, get median sell price, for example, $600,000. 2018/02 there were 870 houses sold, get median sell price, for example, $620,000. Normally, the two prices would not reflectthe same housing price. Then the change of house price would be ($620,000 - $600,000) / $600,000 = $20,000 / $600,000 = 3.33%. This is value is widely used in mortage industry and also news reporting.</a:t>
-            </a:r>
-            <a:endParaRPr lang="en-US"/>
+          </a:p>
+          <a:p>
+            <a:endParaRPr lang="en-US" altLang="zh-CN" dirty="0">
+              <a:sym typeface="+mn-ea"/>
+            </a:endParaRPr>
+          </a:p>
+          <a:p>
+            <a:r>
+              <a:rPr lang="en-US" altLang="zh-CN" dirty="0">
+                <a:sym typeface="+mn-ea"/>
+              </a:rPr>
+              <a:t>Practically, we will do the following:</a:t>
+            </a:r>
+          </a:p>
+          <a:p>
+            <a:endParaRPr lang="en-US" altLang="zh-CN" dirty="0">
+              <a:sym typeface="+mn-ea"/>
+            </a:endParaRPr>
+          </a:p>
+          <a:p>
+            <a:r>
+              <a:rPr lang="en-US" altLang="zh-CN" dirty="0">
+                <a:sym typeface="+mn-ea"/>
+              </a:rPr>
+              <a:t>2018/01                                 2018/02                               2018/03</a:t>
+            </a:r>
+          </a:p>
+          <a:p>
+            <a:r>
+              <a:rPr lang="en-US" altLang="zh-CN" dirty="0">
+                <a:sym typeface="+mn-ea"/>
+              </a:rPr>
+              <a:t>1000 houses sold                  870 houses sold                 935 houses sold</a:t>
+            </a:r>
+          </a:p>
+          <a:p>
+            <a:r>
+              <a:rPr lang="en-US" altLang="zh-CN" dirty="0">
+                <a:sym typeface="+mn-ea"/>
+              </a:rPr>
+              <a:t>Get median sell price         Get median sell price       Get median sell price</a:t>
+            </a:r>
+          </a:p>
+          <a:p>
+            <a:r>
+              <a:rPr lang="en-US" altLang="zh-CN" dirty="0">
+                <a:sym typeface="+mn-ea"/>
+              </a:rPr>
+              <a:t>$600,000                                $620,000                              $610,000</a:t>
+            </a:r>
+          </a:p>
+          <a:p>
+            <a:endParaRPr lang="en-US" altLang="zh-CN" dirty="0">
+              <a:sym typeface="+mn-ea"/>
+            </a:endParaRPr>
+          </a:p>
+          <a:p>
+            <a:r>
+              <a:rPr lang="en-US" altLang="zh-CN" dirty="0"/>
+              <a:t>Then the change of house price would be ($620,000 - $600,000) / $600,000 = $20,000 / $600,000 = 3.33%. This is value is widely used in </a:t>
+            </a:r>
+            <a:r>
+              <a:rPr lang="en-US" altLang="zh-CN" dirty="0" err="1"/>
+              <a:t>mortage</a:t>
+            </a:r>
+            <a:r>
+              <a:rPr lang="en-US" altLang="zh-CN" dirty="0"/>
+              <a:t> industry and also news reporting.</a:t>
+            </a:r>
+          </a:p>
+          <a:p>
+            <a:endParaRPr lang="en-US" dirty="0"/>
           </a:p>
         </p:txBody>
       </p:sp>
     </p:spTree>
+  </p:cSld>
+  <p:clrMapOvr>
+    <a:masterClrMapping/>
+  </p:clrMapOvr>
+</p:sld>
+</file>
+
+<file path=ppt/slides/slide11.xml><?xml version="1.0" encoding="utf-8"?>
+<p:sld xmlns:a="http://schemas.openxmlformats.org/drawingml/2006/main" xmlns:r="http://schemas.openxmlformats.org/officeDocument/2006/relationships" xmlns:p="http://schemas.openxmlformats.org/presentationml/2006/main">
+  <p:cSld>
+    <p:spTree>
+      <p:nvGrpSpPr>
+        <p:cNvPr id="1" name=""/>
+        <p:cNvGrpSpPr/>
+        <p:nvPr/>
+      </p:nvGrpSpPr>
+      <p:grpSpPr>
+        <a:xfrm>
+          <a:off x="0" y="0"/>
+          <a:ext cx="0" cy="0"/>
+          <a:chOff x="0" y="0"/>
+          <a:chExt cx="0" cy="0"/>
+        </a:xfrm>
+      </p:grpSpPr>
+      <p:sp>
+        <p:nvSpPr>
+          <p:cNvPr id="2" name="Title 1"/>
+          <p:cNvSpPr>
+            <a:spLocks noGrp="1"/>
+          </p:cNvSpPr>
+          <p:nvPr>
+            <p:ph type="title"/>
+          </p:nvPr>
+        </p:nvSpPr>
+        <p:spPr/>
+        <p:txBody>
+          <a:bodyPr/>
+          <a:lstStyle/>
+          <a:p>
+            <a:r>
+              <a:rPr lang="en-US"/>
+              <a:t>Case-Shiller Index</a:t>
+            </a:r>
+          </a:p>
+        </p:txBody>
+      </p:sp>
+      <p:sp>
+        <p:nvSpPr>
+          <p:cNvPr id="3" name="Text Box 2"/>
+          <p:cNvSpPr txBox="1"/>
+          <p:nvPr/>
+        </p:nvSpPr>
+        <p:spPr>
+          <a:xfrm>
+            <a:off x="753745" y="2497455"/>
+            <a:ext cx="8773160" cy="2308324"/>
+          </a:xfrm>
+          <a:prstGeom prst="rect">
+            <a:avLst/>
+          </a:prstGeom>
+          <a:noFill/>
+        </p:spPr>
+        <p:txBody>
+          <a:bodyPr wrap="square" rtlCol="0">
+            <a:spAutoFit/>
+          </a:bodyPr>
+          <a:lstStyle/>
+          <a:p>
+            <a:r>
+              <a:rPr lang="en-US" dirty="0"/>
+              <a:t>One question, what if in 2018/02, most housing trades are from cheaper houses, and in 2018/03, most trades are from expensive houses?</a:t>
+            </a:r>
+          </a:p>
+          <a:p>
+            <a:endParaRPr lang="en-US" dirty="0"/>
+          </a:p>
+          <a:p>
+            <a:r>
+              <a:rPr lang="en-US" dirty="0"/>
+              <a:t>This could happen. And usually, we will compare this index in the same type of house.  Like we will calculate a case-</a:t>
+            </a:r>
+            <a:r>
+              <a:rPr lang="en-US" dirty="0" err="1"/>
+              <a:t>shiller</a:t>
+            </a:r>
+            <a:r>
+              <a:rPr lang="en-US" dirty="0"/>
+              <a:t> index in SFH.</a:t>
+            </a:r>
+          </a:p>
+          <a:p>
+            <a:endParaRPr lang="en-US" dirty="0"/>
+          </a:p>
+          <a:p>
+            <a:endParaRPr lang="en-US" dirty="0"/>
+          </a:p>
+          <a:p>
+            <a:endParaRPr lang="en-US" dirty="0"/>
+          </a:p>
+        </p:txBody>
+      </p:sp>
+    </p:spTree>
+    <p:extLst>
+      <p:ext uri="{BB962C8B-B14F-4D97-AF65-F5344CB8AC3E}">
+        <p14:creationId xmlns:p14="http://schemas.microsoft.com/office/powerpoint/2010/main" val="3273238055"/>
+      </p:ext>
+    </p:extLst>
   </p:cSld>
   <p:clrMapOvr>
     <a:masterClrMapping/>
@@ -15334,7 +15467,6 @@
               <a:rPr lang="en-US" dirty="0"/>
               <a:t>Purpose of the Study</a:t>
             </a:r>
-            <a:endParaRPr lang="en-US" dirty="0"/>
           </a:p>
         </p:txBody>
       </p:sp>
@@ -15387,10 +15519,6 @@
               </a:rPr>
               <a:t>will do the following:</a:t>
             </a:r>
-            <a:endParaRPr lang="en-US" sz="2400" dirty="0">
-              <a:latin typeface="Calibri" panose="020F0502020204030204" pitchFamily="34" charset="0"/>
-              <a:ea typeface="Times New Roman" panose="02020603050405020304" pitchFamily="18" charset="0"/>
-            </a:endParaRPr>
           </a:p>
           <a:p>
             <a:pPr marL="0" marR="0" indent="0">
@@ -15431,10 +15559,6 @@
               </a:rPr>
               <a:t>Impact of interest rate on mortgage originations?</a:t>
             </a:r>
-            <a:endParaRPr lang="en-US" sz="2400" dirty="0">
-              <a:latin typeface="Calibri" panose="020F0502020204030204" pitchFamily="34" charset="0"/>
-              <a:ea typeface="Times New Roman" panose="02020603050405020304" pitchFamily="18" charset="0"/>
-            </a:endParaRPr>
           </a:p>
           <a:p>
             <a:pPr marR="0">
@@ -15457,10 +15581,6 @@
               </a:rPr>
               <a:t>Impact of interest rate on home prices?</a:t>
             </a:r>
-            <a:endParaRPr lang="en-US" sz="2400" dirty="0">
-              <a:latin typeface="Calibri" panose="020F0502020204030204" pitchFamily="34" charset="0"/>
-              <a:ea typeface="Times New Roman" panose="02020603050405020304" pitchFamily="18" charset="0"/>
-            </a:endParaRPr>
           </a:p>
           <a:p>
             <a:pPr marR="0">
@@ -15483,10 +15603,6 @@
               </a:rPr>
               <a:t>Tracking home price changes in southern California for four years (2018/01 to 2021/12).  </a:t>
             </a:r>
-            <a:endParaRPr lang="en-US" sz="2400" dirty="0">
-              <a:latin typeface="Calibri" panose="020F0502020204030204" pitchFamily="34" charset="0"/>
-              <a:ea typeface="Times New Roman" panose="02020603050405020304" pitchFamily="18" charset="0"/>
-            </a:endParaRPr>
           </a:p>
         </p:txBody>
       </p:sp>
@@ -15539,7 +15655,6 @@
               <a:rPr lang="en-US" dirty="0"/>
               <a:t>Link to the file for the project</a:t>
             </a:r>
-            <a:endParaRPr lang="en-US" dirty="0"/>
           </a:p>
         </p:txBody>
       </p:sp>
@@ -15581,7 +15696,6 @@
               <a:rPr lang="en-US" sz="2400" dirty="0"/>
               <a:t>- Program 4.1 will process 55GB of data and requires a lot of computing power. </a:t>
             </a:r>
-            <a:endParaRPr lang="en-US" sz="2400" dirty="0"/>
           </a:p>
           <a:p>
             <a:pPr marL="0" marR="0" indent="0">
@@ -15623,7 +15737,6 @@
               <a:rPr lang="en-US" sz="2400" dirty="0"/>
               <a:t> Notebook, you can skip 4.1 and directly use 4.2 after downloading the zipped data from the following link: </a:t>
             </a:r>
-            <a:endParaRPr lang="en-US" sz="2400" dirty="0"/>
           </a:p>
           <a:p>
             <a:pPr marL="0" marR="0" indent="0">
@@ -15642,7 +15755,6 @@
               <a:rPr lang="en-US" sz="800" dirty="0"/>
               <a:t> </a:t>
             </a:r>
-            <a:endParaRPr lang="en-US" sz="800" dirty="0"/>
           </a:p>
           <a:p>
             <a:pPr marL="0" marR="0" indent="0">
@@ -15659,7 +15771,7 @@
             </a:pPr>
             <a:r>
               <a:rPr lang="en-US" sz="2400" dirty="0">
-                <a:hlinkClick r:id="rId1"/>
+                <a:hlinkClick r:id="rId2"/>
               </a:rPr>
               <a:t>https://1drv.ms/u/s!Amfo1lixPzv-j3d8Ft7z2lWyGMwq?e=vChMsW</a:t>
             </a:r>
@@ -15682,7 +15794,6 @@
               <a:rPr lang="en-US" sz="800" dirty="0"/>
               <a:t> </a:t>
             </a:r>
-            <a:endParaRPr lang="en-US" sz="800" dirty="0"/>
           </a:p>
           <a:p>
             <a:pPr marL="0" marR="0" indent="0">
@@ -15701,7 +15812,6 @@
               <a:rPr lang="en-US" sz="2000" dirty="0"/>
               <a:t>There are 18 files after you have unzipped it.  16 files are mortgage origination files from 2018/01 to 2021/12.</a:t>
             </a:r>
-            <a:endParaRPr lang="en-US" sz="2000" dirty="0"/>
           </a:p>
         </p:txBody>
       </p:sp>
@@ -15761,7 +15871,6 @@
               <a:rPr lang="en-US" sz="2800" dirty="0"/>
               <a:t>- Common property types in the US</a:t>
             </a:r>
-            <a:endParaRPr lang="en-US" sz="2800" dirty="0"/>
           </a:p>
         </p:txBody>
       </p:sp>
@@ -15776,7 +15885,7 @@
           </p:nvPr>
         </p:nvPicPr>
         <p:blipFill>
-          <a:blip r:embed="rId1">
+          <a:blip r:embed="rId2">
             <a:extLst>
               <a:ext uri="{28A0092B-C50C-407E-A947-70E740481C1C}">
                 <a14:useLocalDpi xmlns:a14="http://schemas.microsoft.com/office/drawing/2010/main" val="0"/>
@@ -15834,7 +15943,6 @@
               <a:rPr lang="en-US" dirty="0"/>
               <a:t>single family home</a:t>
             </a:r>
-            <a:endParaRPr lang="en-US" dirty="0"/>
           </a:p>
         </p:txBody>
       </p:sp>
@@ -15847,7 +15955,7 @@
           <p:nvPr/>
         </p:nvPicPr>
         <p:blipFill>
-          <a:blip r:embed="rId2">
+          <a:blip r:embed="rId3" cstate="print">
             <a:extLst>
               <a:ext uri="{28A0092B-C50C-407E-A947-70E740481C1C}">
                 <a14:useLocalDpi xmlns:a14="http://schemas.microsoft.com/office/drawing/2010/main" val="0"/>
@@ -15905,7 +16013,6 @@
               <a:rPr lang="en-US" dirty="0"/>
               <a:t>condo</a:t>
             </a:r>
-            <a:endParaRPr lang="en-US" dirty="0"/>
           </a:p>
         </p:txBody>
       </p:sp>
@@ -15943,7 +16050,6 @@
               <a:rPr lang="en-US" sz="1400" dirty="0"/>
               <a:t>planned unit development</a:t>
             </a:r>
-            <a:endParaRPr lang="en-US" sz="1400" dirty="0"/>
           </a:p>
         </p:txBody>
       </p:sp>
@@ -15977,14 +16083,12 @@
               <a:rPr lang="en-US" sz="1600" dirty="0"/>
               <a:t>Usually without a parking garage.</a:t>
             </a:r>
-            <a:endParaRPr lang="en-US" sz="1600" dirty="0"/>
           </a:p>
           <a:p>
             <a:r>
               <a:rPr lang="en-US" sz="1600" dirty="0"/>
               <a:t>Shared parking space with others. </a:t>
             </a:r>
-            <a:endParaRPr lang="en-US" sz="1600" dirty="0"/>
           </a:p>
         </p:txBody>
       </p:sp>
@@ -16014,14 +16118,12 @@
               <a:rPr lang="en-US" sz="1600" dirty="0"/>
               <a:t>- Townhome or detached condo</a:t>
             </a:r>
-            <a:endParaRPr lang="en-US" sz="1600" dirty="0"/>
           </a:p>
           <a:p>
             <a:r>
               <a:rPr lang="en-US" sz="1600" dirty="0"/>
               <a:t>- Usually with a parking garage</a:t>
             </a:r>
-            <a:endParaRPr lang="en-US" sz="1600" dirty="0"/>
           </a:p>
         </p:txBody>
       </p:sp>
@@ -16034,7 +16136,7 @@
           <p:nvPr/>
         </p:nvPicPr>
         <p:blipFill>
-          <a:blip r:embed="rId3">
+          <a:blip r:embed="rId4" cstate="print">
             <a:extLst>
               <a:ext uri="{28A0092B-C50C-407E-A947-70E740481C1C}">
                 <a14:useLocalDpi xmlns:a14="http://schemas.microsoft.com/office/drawing/2010/main" val="0"/>
@@ -16075,7 +16177,7 @@
           <p:nvPr/>
         </p:nvPicPr>
         <p:blipFill>
-          <a:blip r:embed="rId4">
+          <a:blip r:embed="rId5" cstate="print">
             <a:extLst>
               <a:ext uri="{28A0092B-C50C-407E-A947-70E740481C1C}">
                 <a14:useLocalDpi xmlns:a14="http://schemas.microsoft.com/office/drawing/2010/main" val="0"/>
@@ -16163,7 +16265,6 @@
               <a:rPr lang="en-US" sz="2800" dirty="0"/>
               <a:t>- Terms used to define loan performance</a:t>
             </a:r>
-            <a:endParaRPr lang="en-US" sz="2800" dirty="0"/>
           </a:p>
         </p:txBody>
       </p:sp>
@@ -16238,11 +16339,6 @@
               </a:rPr>
               <a:t>Delinquency</a:t>
             </a:r>
-            <a:endParaRPr lang="en-US" sz="2000" dirty="0">
-              <a:effectLst/>
-              <a:latin typeface="Calibri" panose="020F0502020204030204" pitchFamily="34" charset="0"/>
-              <a:ea typeface="Times New Roman" panose="02020603050405020304" pitchFamily="18" charset="0"/>
-            </a:endParaRPr>
           </a:p>
           <a:p>
             <a:pPr lvl="1">
@@ -16262,10 +16358,6 @@
               </a:rPr>
               <a:t>Bucket 1: 30-day past due</a:t>
             </a:r>
-            <a:endParaRPr lang="en-US" sz="1800" dirty="0">
-              <a:latin typeface="Calibri" panose="020F0502020204030204" pitchFamily="34" charset="0"/>
-              <a:ea typeface="Times New Roman" panose="02020603050405020304" pitchFamily="18" charset="0"/>
-            </a:endParaRPr>
           </a:p>
           <a:p>
             <a:pPr lvl="1">
@@ -16286,11 +16378,6 @@
               </a:rPr>
               <a:t>Bucket 2: 60-day past due</a:t>
             </a:r>
-            <a:endParaRPr lang="en-US" sz="1800" dirty="0">
-              <a:effectLst/>
-              <a:latin typeface="Calibri" panose="020F0502020204030204" pitchFamily="34" charset="0"/>
-              <a:ea typeface="Times New Roman" panose="02020603050405020304" pitchFamily="18" charset="0"/>
-            </a:endParaRPr>
           </a:p>
           <a:p>
             <a:pPr lvl="1">
@@ -16310,10 +16397,6 @@
               </a:rPr>
               <a:t>……</a:t>
             </a:r>
-            <a:endParaRPr lang="en-US" sz="1800" dirty="0">
-              <a:latin typeface="Calibri" panose="020F0502020204030204" pitchFamily="34" charset="0"/>
-              <a:ea typeface="Times New Roman" panose="02020603050405020304" pitchFamily="18" charset="0"/>
-            </a:endParaRPr>
           </a:p>
           <a:p>
             <a:pPr lvl="1">
@@ -16369,10 +16452,6 @@
               </a:rPr>
               <a:t>bank) seizes the property for repossession.  That is, the borrower loses the house.</a:t>
             </a:r>
-            <a:endParaRPr lang="en-US" sz="2000" dirty="0">
-              <a:latin typeface="Calibri" panose="020F0502020204030204" pitchFamily="34" charset="0"/>
-              <a:ea typeface="Times New Roman" panose="02020603050405020304" pitchFamily="18" charset="0"/>
-            </a:endParaRPr>
           </a:p>
           <a:p>
             <a:pPr marR="0">
@@ -16414,10 +16493,6 @@
               </a:rPr>
               <a:t>Forbearance: When a borrower encounters some financial stress, he/she negotiates with the borrower for a more lenient term (lower interest rate, pause of payments for some months, temporary paying for interest only, short sale, etc.)</a:t>
             </a:r>
-            <a:endParaRPr lang="en-US" sz="2000" dirty="0">
-              <a:latin typeface="Calibri" panose="020F0502020204030204" pitchFamily="34" charset="0"/>
-              <a:ea typeface="Times New Roman" panose="02020603050405020304" pitchFamily="18" charset="0"/>
-            </a:endParaRPr>
           </a:p>
           <a:p>
             <a:pPr marL="0" marR="0" indent="0">
@@ -16699,7 +16774,6 @@
               <a:rPr lang="en-US" sz="1600" dirty="0"/>
               <a:t>Also used for credit card, car loans, student loans, car loans and personal loans</a:t>
             </a:r>
-            <a:endParaRPr lang="en-US" sz="1600" dirty="0"/>
           </a:p>
         </p:txBody>
       </p:sp>
@@ -16759,7 +16833,6 @@
               <a:rPr lang="en-US" sz="2800" dirty="0"/>
               <a:t>- Factors used in considering a loan application</a:t>
             </a:r>
-            <a:endParaRPr lang="en-US" sz="2800" dirty="0"/>
           </a:p>
         </p:txBody>
       </p:sp>
@@ -16834,11 +16907,6 @@
               </a:rPr>
               <a:t>Loan Purpose</a:t>
             </a:r>
-            <a:endParaRPr lang="en-US" sz="2000" dirty="0">
-              <a:effectLst/>
-              <a:latin typeface="Calibri" panose="020F0502020204030204" pitchFamily="34" charset="0"/>
-              <a:ea typeface="Times New Roman" panose="02020603050405020304" pitchFamily="18" charset="0"/>
-            </a:endParaRPr>
           </a:p>
           <a:p>
             <a:pPr lvl="1">
@@ -16894,10 +16962,6 @@
               </a:rPr>
               <a:t>Relocation to a new place</a:t>
             </a:r>
-            <a:endParaRPr lang="en-US" sz="1200" dirty="0">
-              <a:latin typeface="Calibri" panose="020F0502020204030204" pitchFamily="34" charset="0"/>
-              <a:ea typeface="Times New Roman" panose="02020603050405020304" pitchFamily="18" charset="0"/>
-            </a:endParaRPr>
           </a:p>
           <a:p>
             <a:pPr marL="457200" lvl="1" indent="0">
@@ -16916,10 +16980,6 @@
               </a:rPr>
               <a:t>	Getting married</a:t>
             </a:r>
-            <a:endParaRPr lang="en-US" sz="1200" dirty="0">
-              <a:latin typeface="Calibri" panose="020F0502020204030204" pitchFamily="34" charset="0"/>
-              <a:ea typeface="Times New Roman" panose="02020603050405020304" pitchFamily="18" charset="0"/>
-            </a:endParaRPr>
           </a:p>
           <a:p>
             <a:pPr lvl="1">
@@ -16947,10 +17007,6 @@
               </a:rPr>
               <a:t>refinance (very sensitive to interest rate)</a:t>
             </a:r>
-            <a:endParaRPr lang="en-US" sz="1400" dirty="0">
-              <a:latin typeface="Calibri" panose="020F0502020204030204" pitchFamily="34" charset="0"/>
-              <a:ea typeface="Times New Roman" panose="02020603050405020304" pitchFamily="18" charset="0"/>
-            </a:endParaRPr>
           </a:p>
           <a:p>
             <a:pPr marL="457200" lvl="1" indent="0">
@@ -17015,11 +17071,6 @@
               </a:rPr>
               <a:t>sensitive to interest rate)</a:t>
             </a:r>
-            <a:endParaRPr lang="en-US" sz="1400" dirty="0">
-              <a:effectLst/>
-              <a:latin typeface="Calibri" panose="020F0502020204030204" pitchFamily="34" charset="0"/>
-              <a:ea typeface="Times New Roman" panose="02020603050405020304" pitchFamily="18" charset="0"/>
-            </a:endParaRPr>
           </a:p>
           <a:p>
             <a:pPr marL="457200" lvl="1" indent="0">
@@ -17045,10 +17096,6 @@
               </a:rPr>
               <a:t>Example: A house of $1mm with $600 in unpaid principal (loan amount).</a:t>
             </a:r>
-            <a:endParaRPr lang="en-US" sz="1200" dirty="0">
-              <a:latin typeface="Calibri" panose="020F0502020204030204" pitchFamily="34" charset="0"/>
-              <a:ea typeface="Times New Roman" panose="02020603050405020304" pitchFamily="18" charset="0"/>
-            </a:endParaRPr>
           </a:p>
           <a:p>
             <a:pPr marL="457200" lvl="1" indent="0">
@@ -17068,11 +17115,6 @@
               </a:rPr>
               <a:t>		    The borrower can get $50K from the bank to finance remodeling.</a:t>
             </a:r>
-            <a:endParaRPr lang="en-US" sz="1200" dirty="0">
-              <a:effectLst/>
-              <a:latin typeface="Calibri" panose="020F0502020204030204" pitchFamily="34" charset="0"/>
-              <a:ea typeface="Times New Roman" panose="02020603050405020304" pitchFamily="18" charset="0"/>
-            </a:endParaRPr>
           </a:p>
           <a:p>
             <a:pPr marL="457200" lvl="1" indent="0">
@@ -17119,11 +17161,6 @@
               </a:rPr>
               <a:t>Interest only loans (no payment for principal)</a:t>
             </a:r>
-            <a:endParaRPr lang="en-US" sz="2000" dirty="0">
-              <a:effectLst/>
-              <a:latin typeface="Calibri" panose="020F0502020204030204" pitchFamily="34" charset="0"/>
-              <a:ea typeface="Times New Roman" panose="02020603050405020304" pitchFamily="18" charset="0"/>
-            </a:endParaRPr>
           </a:p>
           <a:p>
             <a:pPr marR="0">
@@ -17146,10 +17183,6 @@
               </a:rPr>
               <a:t>LTV (loan-to-value ratio)  &lt;= 80%</a:t>
             </a:r>
-            <a:endParaRPr lang="en-US" sz="2000" dirty="0">
-              <a:latin typeface="Calibri" panose="020F0502020204030204" pitchFamily="34" charset="0"/>
-              <a:ea typeface="Times New Roman" panose="02020603050405020304" pitchFamily="18" charset="0"/>
-            </a:endParaRPr>
           </a:p>
           <a:p>
             <a:pPr marL="0" marR="0" indent="0">
@@ -17178,10 +17211,6 @@
               </a:rPr>
               <a:t>LTV=loan amount / house selling value</a:t>
             </a:r>
-            <a:endParaRPr lang="en-US" sz="1400" dirty="0">
-              <a:latin typeface="Calibri" panose="020F0502020204030204" pitchFamily="34" charset="0"/>
-              <a:ea typeface="Times New Roman" panose="02020603050405020304" pitchFamily="18" charset="0"/>
-            </a:endParaRPr>
           </a:p>
           <a:p>
             <a:pPr marR="0">
@@ -17204,10 +17233,6 @@
               </a:rPr>
               <a:t>DTI (debt-to-income ratio) &lt;= 42%</a:t>
             </a:r>
-            <a:endParaRPr lang="en-US" sz="2000" dirty="0">
-              <a:latin typeface="Calibri" panose="020F0502020204030204" pitchFamily="34" charset="0"/>
-              <a:ea typeface="Times New Roman" panose="02020603050405020304" pitchFamily="18" charset="0"/>
-            </a:endParaRPr>
           </a:p>
           <a:p>
             <a:pPr marL="0" marR="0" indent="0">
@@ -17238,11 +17263,6 @@
               </a:rPr>
               <a:t>DTI=debt payment /Income (pre tax income)</a:t>
             </a:r>
-            <a:endParaRPr lang="en-US" sz="1600" dirty="0">
-              <a:effectLst/>
-              <a:latin typeface="Calibri" panose="020F0502020204030204" pitchFamily="34" charset="0"/>
-              <a:ea typeface="Times New Roman" panose="02020603050405020304" pitchFamily="18" charset="0"/>
-            </a:endParaRPr>
           </a:p>
         </p:txBody>
       </p:sp>
@@ -17255,7 +17275,7 @@
           <p:nvPr/>
         </p:nvPicPr>
         <p:blipFill>
-          <a:blip r:embed="rId1">
+          <a:blip r:embed="rId2">
             <a:extLst>
               <a:ext uri="{28A0092B-C50C-407E-A947-70E740481C1C}">
                 <a14:useLocalDpi xmlns:a14="http://schemas.microsoft.com/office/drawing/2010/main" val="0"/>
@@ -17349,7 +17369,7 @@
           <p:nvPr/>
         </p:nvPicPr>
         <p:blipFill>
-          <a:blip r:embed="rId1">
+          <a:blip r:embed="rId2">
             <a:extLst>
               <a:ext uri="{28A0092B-C50C-407E-A947-70E740481C1C}">
                 <a14:useLocalDpi xmlns:a14="http://schemas.microsoft.com/office/drawing/2010/main" val="0"/>
@@ -17437,7 +17457,6 @@
               <a:rPr lang="en-US" sz="2000" dirty="0"/>
               <a:t>FICO and loan performance</a:t>
             </a:r>
-            <a:endParaRPr lang="en-US" sz="2000" dirty="0"/>
           </a:p>
         </p:txBody>
       </p:sp>
@@ -17450,7 +17469,7 @@
           <p:nvPr/>
         </p:nvPicPr>
         <p:blipFill>
-          <a:blip r:embed="rId1">
+          <a:blip r:embed="rId2">
             <a:extLst>
               <a:ext uri="{28A0092B-C50C-407E-A947-70E740481C1C}">
                 <a14:useLocalDpi xmlns:a14="http://schemas.microsoft.com/office/drawing/2010/main" val="0"/>
@@ -17491,7 +17510,7 @@
           <p:nvPr/>
         </p:nvPicPr>
         <p:blipFill>
-          <a:blip r:embed="rId2">
+          <a:blip r:embed="rId3">
             <a:extLst>
               <a:ext uri="{28A0092B-C50C-407E-A947-70E740481C1C}">
                 <a14:useLocalDpi xmlns:a14="http://schemas.microsoft.com/office/drawing/2010/main" val="0"/>
@@ -17532,7 +17551,7 @@
           <p:nvPr/>
         </p:nvPicPr>
         <p:blipFill>
-          <a:blip r:embed="rId3">
+          <a:blip r:embed="rId4">
             <a:extLst>
               <a:ext uri="{28A0092B-C50C-407E-A947-70E740481C1C}">
                 <a14:useLocalDpi xmlns:a14="http://schemas.microsoft.com/office/drawing/2010/main" val="0"/>
@@ -17629,7 +17648,7 @@
           <p:nvPr/>
         </p:nvPicPr>
         <p:blipFill>
-          <a:blip r:embed="rId1">
+          <a:blip r:embed="rId2">
             <a:extLst>
               <a:ext uri="{28A0092B-C50C-407E-A947-70E740481C1C}">
                 <a14:useLocalDpi xmlns:a14="http://schemas.microsoft.com/office/drawing/2010/main" val="0"/>
@@ -17687,7 +17706,6 @@
               <a:rPr lang="en-US" dirty="0"/>
               <a:t>Each data point on the graph is labeled by the first 3 digits of the zip codes in southern California. </a:t>
             </a:r>
-            <a:endParaRPr lang="en-US" dirty="0"/>
           </a:p>
         </p:txBody>
       </p:sp>
@@ -17697,6 +17715,13 @@
     <a:masterClrMapping/>
   </p:clrMapOvr>
 </p:sld>
+</file>
+
+<file path=ppt/tags/tag1.xml><?xml version="1.0" encoding="utf-8"?>
+<p:tagLst xmlns:a="http://schemas.openxmlformats.org/drawingml/2006/main" xmlns:r="http://schemas.openxmlformats.org/officeDocument/2006/relationships" xmlns:p="http://schemas.openxmlformats.org/presentationml/2006/main">
+  <p:tag name="KSO_WPP_MARK_KEY" val="9356c219-da00-449e-96d8-32a13f24a165"/>
+  <p:tag name="COMMONDATA" val="eyJoZGlkIjoiZTJmYTc5MWZhZjI5YTBlMGMxYzg3MDdkZTY5ODFjMWQifQ=="/>
+</p:tagLst>
 </file>
 
 <file path=ppt/theme/theme1.xml><?xml version="1.0" encoding="utf-8"?>
@@ -17955,6 +17980,8 @@
       </a:bgFillStyleLst>
     </a:fmtScheme>
   </a:themeElements>
+  <a:objectDefaults/>
+  <a:extraClrSchemeLst/>
   <a:extLst>
     <a:ext uri="{05A4C25C-085E-4340-85A3-A5531E510DB2}">
       <thm15:themeFamily xmlns:thm15="http://schemas.microsoft.com/office/thememl/2012/main" name="Office Theme" id="{62F939B6-93AF-4DB8-9C6B-D6C7DFDC589F}" vid="{4A3C46E8-61CC-4603-A589-7422A47A8E4A}"/>

</xml_diff>